<commit_message>
Added slides about your team, part of #6 and #3
</commit_message>
<xml_diff>
--- a/Documents/Slides/Training Goals.pptx
+++ b/Documents/Slides/Training Goals.pptx
@@ -13,9 +13,10 @@
     <p:sldId id="279" r:id="rId7"/>
     <p:sldId id="278" r:id="rId8"/>
     <p:sldId id="281" r:id="rId9"/>
-    <p:sldId id="276" r:id="rId10"/>
-    <p:sldId id="280" r:id="rId11"/>
-    <p:sldId id="277" r:id="rId12"/>
+    <p:sldId id="282" r:id="rId10"/>
+    <p:sldId id="276" r:id="rId11"/>
+    <p:sldId id="280" r:id="rId12"/>
+    <p:sldId id="277" r:id="rId13"/>
   </p:sldIdLst>
   <p:sldSz cx="12192000" cy="6858000"/>
   <p:notesSz cx="6858000" cy="9144000"/>
@@ -3458,6 +3459,180 @@
           <p:cNvPr id="2" name="Title 1">
             <a:extLst>
               <a:ext uri="{FF2B5EF4-FFF2-40B4-BE49-F238E27FC236}">
+                <a16:creationId xmlns:a16="http://schemas.microsoft.com/office/drawing/2014/main" id="{B73C1AD6-B4CC-6F4B-9A97-52C48A772D8A}"/>
+              </a:ext>
+            </a:extLst>
+          </p:cNvPr>
+          <p:cNvSpPr>
+            <a:spLocks noGrp="1"/>
+          </p:cNvSpPr>
+          <p:nvPr>
+            <p:ph type="title"/>
+          </p:nvPr>
+        </p:nvSpPr>
+        <p:spPr/>
+        <p:txBody>
+          <a:bodyPr/>
+          <a:lstStyle/>
+          <a:p>
+            <a:r>
+              <a:rPr lang="en-US" dirty="0"/>
+              <a:t>Sponsor’s Statement</a:t>
+            </a:r>
+          </a:p>
+        </p:txBody>
+      </p:sp>
+      <p:sp>
+        <p:nvSpPr>
+          <p:cNvPr id="3" name="Content Placeholder 2">
+            <a:extLst>
+              <a:ext uri="{FF2B5EF4-FFF2-40B4-BE49-F238E27FC236}">
+                <a16:creationId xmlns:a16="http://schemas.microsoft.com/office/drawing/2014/main" id="{A8B89D5A-07B3-B64A-8B82-40FCF400191C}"/>
+              </a:ext>
+            </a:extLst>
+          </p:cNvPr>
+          <p:cNvSpPr>
+            <a:spLocks noGrp="1"/>
+          </p:cNvSpPr>
+          <p:nvPr>
+            <p:ph idx="1"/>
+          </p:nvPr>
+        </p:nvSpPr>
+        <p:spPr/>
+        <p:txBody>
+          <a:bodyPr/>
+          <a:lstStyle/>
+          <a:p>
+            <a:r>
+              <a:rPr lang="en-US" dirty="0"/>
+              <a:t>Written by sponsor and co-sponsors</a:t>
+            </a:r>
+          </a:p>
+          <a:p>
+            <a:r>
+              <a:rPr lang="en-US" dirty="0"/>
+              <a:t>Five key sections (A-E)</a:t>
+            </a:r>
+          </a:p>
+          <a:p>
+            <a:pPr marL="971550" lvl="1" indent="-514350">
+              <a:buFont typeface="+mj-lt"/>
+              <a:buAutoNum type="alphaUcPeriod"/>
+            </a:pPr>
+            <a:r>
+              <a:rPr lang="en-US" dirty="0"/>
+              <a:t>Available Research Support – make a table of current/pending funds</a:t>
+            </a:r>
+          </a:p>
+          <a:p>
+            <a:pPr marL="971550" lvl="1" indent="-514350">
+              <a:buFont typeface="+mj-lt"/>
+              <a:buAutoNum type="alphaUcPeriod"/>
+            </a:pPr>
+            <a:r>
+              <a:rPr lang="en-US" dirty="0"/>
+              <a:t>Sponsor’s/Co-Sponsor’s Previous Fellows/Trainees – table including current positions.  Should be complete</a:t>
+            </a:r>
+          </a:p>
+          <a:p>
+            <a:pPr marL="971550" lvl="1" indent="-514350">
+              <a:buFont typeface="+mj-lt"/>
+              <a:buAutoNum type="alphaUcPeriod"/>
+            </a:pPr>
+            <a:r>
+              <a:rPr lang="en-US" dirty="0"/>
+              <a:t>Training Plan, Environment, and Research Facilities</a:t>
+            </a:r>
+          </a:p>
+          <a:p>
+            <a:pPr lvl="2"/>
+            <a:r>
+              <a:rPr lang="en-US" dirty="0"/>
+              <a:t>You will have separate documents describing these in detail, ask your PI for a copy (no page limits)</a:t>
+            </a:r>
+          </a:p>
+          <a:p>
+            <a:pPr marL="457200" lvl="1" indent="0">
+              <a:buNone/>
+            </a:pPr>
+            <a:r>
+              <a:rPr lang="en-US" dirty="0"/>
+              <a:t>D.	Number of Fellows/Trainees to be Supervised During the Fellowship</a:t>
+            </a:r>
+          </a:p>
+          <a:p>
+            <a:pPr marL="457200" lvl="1" indent="0">
+              <a:buNone/>
+            </a:pPr>
+            <a:r>
+              <a:rPr lang="en-US" dirty="0"/>
+              <a:t>E.	Applicant’s Qualifications and Potential for a Research Career</a:t>
+            </a:r>
+          </a:p>
+          <a:p>
+            <a:pPr marL="457200" lvl="1" indent="0">
+              <a:buNone/>
+            </a:pPr>
+            <a:endParaRPr lang="en-US" dirty="0"/>
+          </a:p>
+          <a:p>
+            <a:pPr marL="914400" lvl="1" indent="-457200">
+              <a:buFont typeface="+mj-lt"/>
+              <a:buAutoNum type="alphaUcPeriod"/>
+            </a:pPr>
+            <a:endParaRPr lang="en-US" dirty="0"/>
+          </a:p>
+          <a:p>
+            <a:pPr marL="971550" lvl="1" indent="-514350">
+              <a:buFont typeface="+mj-lt"/>
+              <a:buAutoNum type="alphaUcPeriod"/>
+            </a:pPr>
+            <a:endParaRPr lang="en-US" dirty="0"/>
+          </a:p>
+          <a:p>
+            <a:pPr marL="971550" lvl="1" indent="-514350">
+              <a:buFont typeface="+mj-lt"/>
+              <a:buAutoNum type="alphaUcPeriod"/>
+            </a:pPr>
+            <a:endParaRPr lang="en-US" dirty="0"/>
+          </a:p>
+        </p:txBody>
+      </p:sp>
+    </p:spTree>
+    <p:extLst>
+      <p:ext uri="{BB962C8B-B14F-4D97-AF65-F5344CB8AC3E}">
+        <p14:creationId xmlns:p14="http://schemas.microsoft.com/office/powerpoint/2010/main" val="1398344014"/>
+      </p:ext>
+    </p:extLst>
+  </p:cSld>
+  <p:clrMapOvr>
+    <a:masterClrMapping/>
+  </p:clrMapOvr>
+</p:sld>
+</file>
+
+<file path=ppt/slides/slide11.xml><?xml version="1.0" encoding="utf-8"?>
+<p:sld xmlns:a="http://schemas.openxmlformats.org/drawingml/2006/main" xmlns:r="http://schemas.openxmlformats.org/officeDocument/2006/relationships" xmlns:p="http://schemas.openxmlformats.org/presentationml/2006/main">
+  <p:cSld>
+    <p:spTree>
+      <p:nvGrpSpPr>
+        <p:cNvPr id="1" name=""/>
+        <p:cNvGrpSpPr/>
+        <p:nvPr/>
+      </p:nvGrpSpPr>
+      <p:grpSpPr>
+        <a:xfrm>
+          <a:off x="0" y="0"/>
+          <a:ext cx="0" cy="0"/>
+          <a:chOff x="0" y="0"/>
+          <a:chExt cx="0" cy="0"/>
+        </a:xfrm>
+      </p:grpSpPr>
+      <p:sp>
+        <p:nvSpPr>
+          <p:cNvPr id="2" name="Title 1">
+            <a:extLst>
+              <a:ext uri="{FF2B5EF4-FFF2-40B4-BE49-F238E27FC236}">
                 <a16:creationId xmlns:a16="http://schemas.microsoft.com/office/drawing/2014/main" id="{C5E44874-F2AC-4445-BC3B-942258D52947}"/>
               </a:ext>
             </a:extLst>
@@ -3548,7 +3723,7 @@
 </p:sld>
 </file>
 
-<file path=ppt/slides/slide11.xml><?xml version="1.0" encoding="utf-8"?>
+<file path=ppt/slides/slide12.xml><?xml version="1.0" encoding="utf-8"?>
 <p:sld xmlns:a="http://schemas.openxmlformats.org/drawingml/2006/main" xmlns:r="http://schemas.openxmlformats.org/officeDocument/2006/relationships" xmlns:p="http://schemas.openxmlformats.org/presentationml/2006/main">
   <p:cSld>
     <p:spTree>
@@ -4309,7 +4484,7 @@
           <a:p>
             <a:r>
               <a:rPr lang="en-US" dirty="0"/>
-              <a:t>Candidate Introduction Scoring</a:t>
+              <a:t>Candidate Introduction Scoring Criteria</a:t>
             </a:r>
           </a:p>
         </p:txBody>
@@ -4332,10 +4507,42 @@
         </p:nvSpPr>
         <p:spPr/>
         <p:txBody>
-          <a:bodyPr/>
-          <a:lstStyle/>
-          <a:p>
-            <a:endParaRPr lang="en-US"/>
+          <a:bodyPr>
+            <a:normAutofit fontScale="92500" lnSpcReduction="20000"/>
+          </a:bodyPr>
+          <a:lstStyle/>
+          <a:p>
+            <a:r>
+              <a:rPr lang="en-US" dirty="0"/>
+              <a:t>Are the candidate's academic record and research experience of high quality? </a:t>
+            </a:r>
+          </a:p>
+          <a:p>
+            <a:r>
+              <a:rPr lang="en-US" dirty="0"/>
+              <a:t>Does the candidate have the potential to develop into an independent and productive researcher? </a:t>
+            </a:r>
+          </a:p>
+          <a:p>
+            <a:r>
+              <a:rPr lang="en-US" dirty="0"/>
+              <a:t>Does the candidate demonstrate commitment to a research career in the future?</a:t>
+            </a:r>
+          </a:p>
+          <a:p>
+            <a:r>
+              <a:rPr lang="en-US" dirty="0"/>
+              <a:t>Does the training plan take advantage of the candidate’s strengths and address gaps in needed skills? Does the training plan document a clear need for, and value of, the proposed training?</a:t>
+            </a:r>
+          </a:p>
+          <a:p>
+            <a:r>
+              <a:rPr lang="en-US" dirty="0"/>
+              <a:t>Does the proposed training have the potential to serve as a sound foundation that will clearly enhance the candidate’s ability to develop into a productive researcher? </a:t>
+            </a:r>
+          </a:p>
+          <a:p>
+            <a:endParaRPr lang="en-US" dirty="0"/>
           </a:p>
         </p:txBody>
       </p:sp>
@@ -7146,7 +7353,7 @@
           <p:cNvPr id="2" name="Title 1">
             <a:extLst>
               <a:ext uri="{FF2B5EF4-FFF2-40B4-BE49-F238E27FC236}">
-                <a16:creationId xmlns:a16="http://schemas.microsoft.com/office/drawing/2014/main" id="{B73C1AD6-B4CC-6F4B-9A97-52C48A772D8A}"/>
+                <a16:creationId xmlns:a16="http://schemas.microsoft.com/office/drawing/2014/main" id="{16FD218A-6CA9-0045-B518-13F73EBCC451}"/>
               </a:ext>
             </a:extLst>
           </p:cNvPr>
@@ -7164,7 +7371,7 @@
           <a:p>
             <a:r>
               <a:rPr lang="en-US" dirty="0"/>
-              <a:t>Sponsor’s Statement</a:t>
+              <a:t>Identify your team</a:t>
             </a:r>
           </a:p>
         </p:txBody>
@@ -7174,7 +7381,7 @@
           <p:cNvPr id="3" name="Content Placeholder 2">
             <a:extLst>
               <a:ext uri="{FF2B5EF4-FFF2-40B4-BE49-F238E27FC236}">
-                <a16:creationId xmlns:a16="http://schemas.microsoft.com/office/drawing/2014/main" id="{A8B89D5A-07B3-B64A-8B82-40FCF400191C}"/>
+                <a16:creationId xmlns:a16="http://schemas.microsoft.com/office/drawing/2014/main" id="{02B2709B-59D7-1C46-93D7-A37B83078F1D}"/>
               </a:ext>
             </a:extLst>
           </p:cNvPr>
@@ -7187,108 +7394,79 @@
         </p:nvSpPr>
         <p:spPr/>
         <p:txBody>
-          <a:bodyPr/>
+          <a:bodyPr>
+            <a:normAutofit fontScale="92500" lnSpcReduction="20000"/>
+          </a:bodyPr>
           <a:lstStyle/>
           <a:p>
             <a:r>
               <a:rPr lang="en-US" dirty="0"/>
-              <a:t>Written by sponsor and co-sponsors</a:t>
+              <a:t>Sponsor/co-sponsor</a:t>
             </a:r>
           </a:p>
           <a:p>
             <a:r>
               <a:rPr lang="en-US" dirty="0"/>
-              <a:t>Five key sections (A-E)</a:t>
-            </a:r>
-          </a:p>
-          <a:p>
-            <a:pPr marL="971550" lvl="1" indent="-514350">
-              <a:buFont typeface="+mj-lt"/>
-              <a:buAutoNum type="alphaUcPeriod"/>
-            </a:pPr>
+              <a:t>Collaborators</a:t>
+            </a:r>
+          </a:p>
+          <a:p>
             <a:r>
               <a:rPr lang="en-US" dirty="0"/>
-              <a:t>Available Research Support – make a table of current/pending funds</a:t>
-            </a:r>
-          </a:p>
-          <a:p>
-            <a:pPr marL="971550" lvl="1" indent="-514350">
-              <a:buFont typeface="+mj-lt"/>
-              <a:buAutoNum type="alphaUcPeriod"/>
-            </a:pPr>
+              <a:t>Consultants</a:t>
+            </a:r>
+          </a:p>
+          <a:p>
             <a:r>
               <a:rPr lang="en-US" dirty="0"/>
-              <a:t>Sponsor’s/Co-Sponsor’s Previous Fellows/Trainees – table including current positions.  Should be complete</a:t>
-            </a:r>
-          </a:p>
-          <a:p>
-            <a:pPr marL="971550" lvl="1" indent="-514350">
-              <a:buFont typeface="+mj-lt"/>
-              <a:buAutoNum type="alphaUcPeriod"/>
-            </a:pPr>
-            <a:r>
-              <a:rPr lang="en-US" dirty="0"/>
-              <a:t>Training Plan, Environment, and Research Facilities</a:t>
-            </a:r>
-          </a:p>
-          <a:p>
-            <a:pPr lvl="2"/>
-            <a:r>
-              <a:rPr lang="en-US" dirty="0"/>
-              <a:t>You will have separate documents describing these in detail, ask your PI for a copy (no page limits)</a:t>
-            </a:r>
-          </a:p>
-          <a:p>
-            <a:pPr marL="457200" lvl="1" indent="0">
+              <a:t>Co-Investigators</a:t>
+            </a:r>
+          </a:p>
+          <a:p>
+            <a:endParaRPr lang="en-US" dirty="0"/>
+          </a:p>
+          <a:p>
+            <a:pPr marL="0" indent="0">
               <a:buNone/>
             </a:pPr>
             <a:r>
               <a:rPr lang="en-US" dirty="0"/>
-              <a:t>D.	Number of Fellows/Trainees to be Supervised During the Fellowship</a:t>
-            </a:r>
-          </a:p>
-          <a:p>
-            <a:pPr marL="457200" lvl="1" indent="0">
-              <a:buNone/>
-            </a:pPr>
-            <a:r>
-              <a:rPr lang="en-US" dirty="0"/>
-              <a:t>E.	Applicant’s Qualifications and Potential for a Research Career</a:t>
-            </a:r>
-          </a:p>
-          <a:p>
-            <a:pPr marL="457200" lvl="1" indent="0">
+              <a:t>Think about who can supervise and evaluate your training goals/activities.   You will need letters of support describing their contributions.</a:t>
+            </a:r>
+          </a:p>
+          <a:p>
+            <a:pPr marL="0" indent="0">
               <a:buNone/>
             </a:pPr>
             <a:endParaRPr lang="en-US" dirty="0"/>
           </a:p>
           <a:p>
-            <a:pPr marL="914400" lvl="1" indent="-457200">
-              <a:buFont typeface="+mj-lt"/>
-              <a:buAutoNum type="alphaUcPeriod"/>
+            <a:pPr marL="0" indent="0">
+              <a:buNone/>
             </a:pPr>
-            <a:endParaRPr lang="en-US" dirty="0"/>
-          </a:p>
-          <a:p>
-            <a:pPr marL="971550" lvl="1" indent="-514350">
-              <a:buFont typeface="+mj-lt"/>
-              <a:buAutoNum type="alphaUcPeriod"/>
-            </a:pPr>
-            <a:endParaRPr lang="en-US" dirty="0"/>
-          </a:p>
-          <a:p>
-            <a:pPr marL="971550" lvl="1" indent="-514350">
-              <a:buFont typeface="+mj-lt"/>
-              <a:buAutoNum type="alphaUcPeriod"/>
-            </a:pPr>
-            <a:endParaRPr lang="en-US" dirty="0"/>
+            <a:r>
+              <a:rPr lang="en-US" dirty="0"/>
+              <a:t>Describe when will you meet</a:t>
+            </a:r>
+          </a:p>
+          <a:p>
+            <a:r>
+              <a:rPr lang="en-US" dirty="0"/>
+              <a:t>Regular meetings for training/feedback</a:t>
+            </a:r>
+          </a:p>
+          <a:p>
+            <a:r>
+              <a:rPr lang="en-US" dirty="0"/>
+              <a:t>Every six months – a year: group meeting to evaluate progress </a:t>
+            </a:r>
           </a:p>
         </p:txBody>
       </p:sp>
     </p:spTree>
     <p:extLst>
       <p:ext uri="{BB962C8B-B14F-4D97-AF65-F5344CB8AC3E}">
-        <p14:creationId xmlns:p14="http://schemas.microsoft.com/office/powerpoint/2010/main" val="1398344014"/>
+        <p14:creationId xmlns:p14="http://schemas.microsoft.com/office/powerpoint/2010/main" val="397224711"/>
       </p:ext>
     </p:extLst>
   </p:cSld>

</xml_diff>